<commit_message>
Förbättrat innehåll och design
</commit_message>
<xml_diff>
--- a/Presentation_OS.pptx
+++ b/Presentation_OS.pptx
@@ -203,7 +203,7 @@
           <a:p>
             <a:fld id="{A0427023-CC46-478A-B80A-5FBB7846D737}" type="datetimeFigureOut">
               <a:rPr lang="sv-SE" smtClean="0"/>
-              <a:t>2024-11-23</a:t>
+              <a:t>2024-11-24</a:t>
             </a:fld>
             <a:endParaRPr lang="sv-SE"/>
           </a:p>
@@ -805,7 +805,7 @@
           <a:p>
             <a:fld id="{046DAC27-7139-44BC-B87C-07E7D02E5E8B}" type="datetime1">
               <a:rPr lang="en-US" smtClean="0"/>
-              <a:t>11/23/2024</a:t>
+              <a:t>11/24/2024</a:t>
             </a:fld>
             <a:endParaRPr lang="en-US" dirty="0"/>
           </a:p>
@@ -1889,7 +1889,7 @@
           <a:p>
             <a:fld id="{5FE19E3F-6299-48ED-B2C8-FB77D3D1D25A}" type="datetime1">
               <a:rPr lang="en-US" smtClean="0"/>
-              <a:t>11/23/2024</a:t>
+              <a:t>11/24/2024</a:t>
             </a:fld>
             <a:endParaRPr lang="en-US" dirty="0"/>
           </a:p>
@@ -2865,7 +2865,7 @@
           <a:p>
             <a:fld id="{A4F95E46-9EDF-4171-8795-87BEDA34DA2B}" type="datetime1">
               <a:rPr lang="en-US" smtClean="0"/>
-              <a:t>11/23/2024</a:t>
+              <a:t>11/24/2024</a:t>
             </a:fld>
             <a:endParaRPr lang="en-US" dirty="0"/>
           </a:p>
@@ -3995,7 +3995,7 @@
           <a:p>
             <a:fld id="{027A8DF1-0C66-4D18-AEE6-A3196EC5397E}" type="datetime1">
               <a:rPr lang="en-US" smtClean="0"/>
-              <a:t>11/23/2024</a:t>
+              <a:t>11/24/2024</a:t>
             </a:fld>
             <a:endParaRPr lang="en-US" dirty="0"/>
           </a:p>
@@ -5024,7 +5024,7 @@
           <a:p>
             <a:fld id="{AC4B0A40-FADD-4669-8F4F-F8F044581822}" type="datetime1">
               <a:rPr lang="en-US" smtClean="0"/>
-              <a:t>11/23/2024</a:t>
+              <a:t>11/24/2024</a:t>
             </a:fld>
             <a:endParaRPr lang="en-US" dirty="0"/>
           </a:p>
@@ -5680,7 +5680,7 @@
           <a:p>
             <a:fld id="{0D3FE16C-D0EE-4A10-9CE9-C0F1A27C5D5D}" type="datetime1">
               <a:rPr lang="en-US" smtClean="0"/>
-              <a:t>11/23/2024</a:t>
+              <a:t>11/24/2024</a:t>
             </a:fld>
             <a:endParaRPr lang="en-US" dirty="0"/>
           </a:p>
@@ -6537,7 +6537,7 @@
           <a:p>
             <a:fld id="{F74902BD-8888-473F-8A23-3B7FE274C5D4}" type="datetime1">
               <a:rPr lang="en-US" smtClean="0"/>
-              <a:t>11/23/2024</a:t>
+              <a:t>11/24/2024</a:t>
             </a:fld>
             <a:endParaRPr lang="en-US" dirty="0"/>
           </a:p>
@@ -6723,7 +6723,7 @@
           <a:p>
             <a:fld id="{718D542D-DA5C-4CED-B91E-FDB00717696B}" type="datetime1">
               <a:rPr lang="en-US" smtClean="0"/>
-              <a:t>11/23/2024</a:t>
+              <a:t>11/24/2024</a:t>
             </a:fld>
             <a:endParaRPr lang="en-US" dirty="0"/>
           </a:p>
@@ -7691,7 +7691,7 @@
           <a:p>
             <a:fld id="{9D7CDFFA-B62F-428F-ABF1-B601F70E5750}" type="datetime1">
               <a:rPr lang="en-US" smtClean="0"/>
-              <a:t>11/23/2024</a:t>
+              <a:t>11/24/2024</a:t>
             </a:fld>
             <a:endParaRPr lang="en-US" dirty="0"/>
           </a:p>
@@ -7898,7 +7898,7 @@
           <a:p>
             <a:fld id="{A473902A-7B2A-417E-9D50-D2CB16F45A69}" type="datetime1">
               <a:rPr lang="en-US" smtClean="0"/>
-              <a:t>11/23/2024</a:t>
+              <a:t>11/24/2024</a:t>
             </a:fld>
             <a:endParaRPr lang="en-US" dirty="0"/>
           </a:p>
@@ -8928,7 +8928,7 @@
           <a:p>
             <a:fld id="{4ACC0F2C-B1D9-4D35-BF93-7E7FD219CDFE}" type="datetime1">
               <a:rPr lang="en-US" smtClean="0"/>
-              <a:t>11/23/2024</a:t>
+              <a:t>11/24/2024</a:t>
             </a:fld>
             <a:endParaRPr lang="en-US" dirty="0"/>
           </a:p>
@@ -9196,7 +9196,7 @@
           <a:p>
             <a:fld id="{D3DAE985-37C6-4766-9823-A85F38558E60}" type="datetime1">
               <a:rPr lang="en-US" smtClean="0"/>
-              <a:t>11/23/2024</a:t>
+              <a:t>11/24/2024</a:t>
             </a:fld>
             <a:endParaRPr lang="en-US" dirty="0"/>
           </a:p>
@@ -9602,7 +9602,7 @@
           <a:p>
             <a:fld id="{C497F851-AFBC-4D0E-A120-9331E1C2CBB1}" type="datetime1">
               <a:rPr lang="en-US" smtClean="0"/>
-              <a:t>11/23/2024</a:t>
+              <a:t>11/24/2024</a:t>
             </a:fld>
             <a:endParaRPr lang="en-US" dirty="0"/>
           </a:p>
@@ -9725,7 +9725,7 @@
           <a:p>
             <a:fld id="{7B99844A-961B-4AD8-87F8-0EFFB59695F1}" type="datetime1">
               <a:rPr lang="en-US" smtClean="0"/>
-              <a:t>11/23/2024</a:t>
+              <a:t>11/24/2024</a:t>
             </a:fld>
             <a:endParaRPr lang="en-US" dirty="0"/>
           </a:p>
@@ -9816,7 +9816,7 @@
           <a:p>
             <a:fld id="{1680F421-3420-4A00-A09B-40A194D272C8}" type="datetime1">
               <a:rPr lang="en-US" smtClean="0"/>
-              <a:t>11/23/2024</a:t>
+              <a:t>11/24/2024</a:t>
             </a:fld>
             <a:endParaRPr lang="en-US" dirty="0"/>
           </a:p>
@@ -10893,7 +10893,7 @@
           <a:p>
             <a:fld id="{A45BB119-9ED8-44AC-B9E9-B0CEDF585D4B}" type="datetime1">
               <a:rPr lang="en-US" smtClean="0"/>
-              <a:t>11/23/2024</a:t>
+              <a:t>11/24/2024</a:t>
             </a:fld>
             <a:endParaRPr lang="en-US" dirty="0"/>
           </a:p>
@@ -11997,7 +11997,7 @@
           <a:p>
             <a:fld id="{6C78DC7F-7811-483C-B0FA-54716F077D45}" type="datetime1">
               <a:rPr lang="en-US" smtClean="0"/>
-              <a:t>11/23/2024</a:t>
+              <a:t>11/24/2024</a:t>
             </a:fld>
             <a:endParaRPr lang="en-US" dirty="0"/>
           </a:p>
@@ -12990,7 +12990,7 @@
           <a:p>
             <a:fld id="{62AEBD52-C901-4A15-A5A5-6190B4EEB46C}" type="datetime1">
               <a:rPr lang="en-US" smtClean="0"/>
-              <a:t>11/23/2024</a:t>
+              <a:t>11/24/2024</a:t>
             </a:fld>
             <a:endParaRPr lang="en-US" dirty="0"/>
           </a:p>
@@ -14189,7 +14189,7 @@
                 <a:latin typeface="Cambria" panose="02040503050406030204" pitchFamily="18" charset="0"/>
                 <a:ea typeface="Cambria" panose="02040503050406030204" pitchFamily="18" charset="0"/>
               </a:rPr>
-              <a:t>Användning av olika verktyg: </a:t>
+              <a:t>Användning av verktyg: </a:t>
             </a:r>
           </a:p>
           <a:p>
@@ -14520,8 +14520,8 @@
         </p:nvSpPr>
         <p:spPr>
           <a:xfrm>
-            <a:off x="1574800" y="1066800"/>
-            <a:ext cx="8829040" cy="4447371"/>
+            <a:off x="1001261" y="589761"/>
+            <a:ext cx="10678160" cy="5678478"/>
           </a:xfrm>
           <a:prstGeom prst="rect">
             <a:avLst/>
@@ -14560,7 +14560,7 @@
               <a:buChar char="Ø"/>
             </a:pPr>
             <a:r>
-              <a:rPr lang="sv-SE" sz="2000" dirty="0" err="1">
+              <a:rPr lang="sv-SE" sz="2000" b="1" dirty="0" err="1">
                 <a:solidFill>
                   <a:schemeClr val="bg1"/>
                 </a:solidFill>
@@ -14570,7 +14570,7 @@
               <a:t>decribe</a:t>
             </a:r>
             <a:r>
-              <a:rPr lang="sv-SE" sz="2000" dirty="0">
+              <a:rPr lang="sv-SE" sz="2000" b="1" dirty="0">
                 <a:solidFill>
                   <a:schemeClr val="bg1"/>
                 </a:solidFill>
@@ -14581,12 +14581,54 @@
             </a:r>
           </a:p>
           <a:p>
+            <a:r>
+              <a:rPr lang="sv-SE" sz="2000" dirty="0">
+                <a:solidFill>
+                  <a:schemeClr val="bg1"/>
+                </a:solidFill>
+                <a:latin typeface="Cambria" panose="02040503050406030204" pitchFamily="18" charset="0"/>
+                <a:ea typeface="Cambria" panose="02040503050406030204" pitchFamily="18" charset="0"/>
+              </a:rPr>
+              <a:t>	</a:t>
+            </a:r>
+            <a:r>
+              <a:rPr lang="sv-SE" dirty="0">
+                <a:solidFill>
+                  <a:schemeClr val="bg1"/>
+                </a:solidFill>
+                <a:latin typeface="Cambria" panose="02040503050406030204" pitchFamily="18" charset="0"/>
+                <a:ea typeface="Cambria" panose="02040503050406030204" pitchFamily="18" charset="0"/>
+              </a:rPr>
+              <a:t>Ger en statistisk sammanfattning av </a:t>
+            </a:r>
+            <a:r>
+              <a:rPr lang="sv-SE" dirty="0" err="1">
+                <a:solidFill>
+                  <a:schemeClr val="bg1"/>
+                </a:solidFill>
+                <a:latin typeface="Cambria" panose="02040503050406030204" pitchFamily="18" charset="0"/>
+                <a:ea typeface="Cambria" panose="02040503050406030204" pitchFamily="18" charset="0"/>
+              </a:rPr>
+              <a:t>DataFrame</a:t>
+            </a:r>
+            <a:r>
+              <a:rPr lang="sv-SE" dirty="0">
+                <a:solidFill>
+                  <a:schemeClr val="bg1"/>
+                </a:solidFill>
+                <a:latin typeface="Cambria" panose="02040503050406030204" pitchFamily="18" charset="0"/>
+                <a:ea typeface="Cambria" panose="02040503050406030204" pitchFamily="18" charset="0"/>
+              </a:rPr>
+              <a:t> eller Series</a:t>
+            </a:r>
+          </a:p>
+          <a:p>
             <a:pPr marL="342900" indent="-342900">
               <a:buFont typeface="Wingdings" panose="05000000000000000000" pitchFamily="2" charset="2"/>
               <a:buChar char="Ø"/>
             </a:pPr>
             <a:r>
-              <a:rPr lang="sv-SE" sz="2000" dirty="0" err="1">
+              <a:rPr lang="sv-SE" sz="2000" b="1" dirty="0" err="1">
                 <a:solidFill>
                   <a:schemeClr val="bg1"/>
                 </a:solidFill>
@@ -14596,7 +14638,7 @@
               <a:t>dropna</a:t>
             </a:r>
             <a:r>
-              <a:rPr lang="sv-SE" sz="2000" dirty="0">
+              <a:rPr lang="sv-SE" sz="2000" b="1" dirty="0">
                 <a:solidFill>
                   <a:schemeClr val="bg1"/>
                 </a:solidFill>
@@ -14607,12 +14649,54 @@
             </a:r>
           </a:p>
           <a:p>
+            <a:r>
+              <a:rPr lang="sv-SE" sz="2000" dirty="0">
+                <a:solidFill>
+                  <a:schemeClr val="bg1"/>
+                </a:solidFill>
+                <a:latin typeface="Cambria" panose="02040503050406030204" pitchFamily="18" charset="0"/>
+                <a:ea typeface="Cambria" panose="02040503050406030204" pitchFamily="18" charset="0"/>
+              </a:rPr>
+              <a:t>	</a:t>
+            </a:r>
+            <a:r>
+              <a:rPr lang="sv-SE" dirty="0">
+                <a:solidFill>
+                  <a:schemeClr val="bg1"/>
+                </a:solidFill>
+                <a:latin typeface="Cambria" panose="02040503050406030204" pitchFamily="18" charset="0"/>
+                <a:ea typeface="Cambria" panose="02040503050406030204" pitchFamily="18" charset="0"/>
+              </a:rPr>
+              <a:t>Tar bort rader eller kolumner som innehåller </a:t>
+            </a:r>
+            <a:r>
+              <a:rPr lang="sv-SE" dirty="0" err="1">
+                <a:solidFill>
+                  <a:schemeClr val="bg1"/>
+                </a:solidFill>
+                <a:latin typeface="Cambria" panose="02040503050406030204" pitchFamily="18" charset="0"/>
+                <a:ea typeface="Cambria" panose="02040503050406030204" pitchFamily="18" charset="0"/>
+              </a:rPr>
+              <a:t>NaN</a:t>
+            </a:r>
+            <a:r>
+              <a:rPr lang="sv-SE" dirty="0">
+                <a:solidFill>
+                  <a:schemeClr val="bg1"/>
+                </a:solidFill>
+                <a:latin typeface="Cambria" panose="02040503050406030204" pitchFamily="18" charset="0"/>
+                <a:ea typeface="Cambria" panose="02040503050406030204" pitchFamily="18" charset="0"/>
+              </a:rPr>
+              <a:t>-värden</a:t>
+            </a:r>
+          </a:p>
+          <a:p>
             <a:pPr marL="342900" indent="-342900">
               <a:buFont typeface="Wingdings" panose="05000000000000000000" pitchFamily="2" charset="2"/>
               <a:buChar char="Ø"/>
             </a:pPr>
             <a:r>
-              <a:rPr lang="sv-SE" sz="2000" dirty="0">
+              <a:rPr lang="sv-SE" sz="2000" b="1" dirty="0">
                 <a:solidFill>
                   <a:schemeClr val="bg1"/>
                 </a:solidFill>
@@ -14623,12 +14707,81 @@
             </a:r>
           </a:p>
           <a:p>
+            <a:r>
+              <a:rPr lang="sv-SE" sz="2000" dirty="0">
+                <a:solidFill>
+                  <a:schemeClr val="bg1"/>
+                </a:solidFill>
+                <a:latin typeface="Cambria" panose="02040503050406030204" pitchFamily="18" charset="0"/>
+                <a:ea typeface="Cambria" panose="02040503050406030204" pitchFamily="18" charset="0"/>
+              </a:rPr>
+              <a:t>	</a:t>
+            </a:r>
+            <a:r>
+              <a:rPr lang="sv-SE" dirty="0">
+                <a:solidFill>
+                  <a:schemeClr val="bg1"/>
+                </a:solidFill>
+                <a:latin typeface="Cambria" panose="02040503050406030204" pitchFamily="18" charset="0"/>
+                <a:ea typeface="Cambria" panose="02040503050406030204" pitchFamily="18" charset="0"/>
+              </a:rPr>
+              <a:t>Visar information om </a:t>
+            </a:r>
+            <a:r>
+              <a:rPr lang="sv-SE" dirty="0" err="1">
+                <a:solidFill>
+                  <a:schemeClr val="bg1"/>
+                </a:solidFill>
+                <a:latin typeface="Cambria" panose="02040503050406030204" pitchFamily="18" charset="0"/>
+                <a:ea typeface="Cambria" panose="02040503050406030204" pitchFamily="18" charset="0"/>
+              </a:rPr>
+              <a:t>DataFrame</a:t>
+            </a:r>
+            <a:r>
+              <a:rPr lang="sv-SE" dirty="0">
+                <a:solidFill>
+                  <a:schemeClr val="bg1"/>
+                </a:solidFill>
+                <a:latin typeface="Cambria" panose="02040503050406030204" pitchFamily="18" charset="0"/>
+                <a:ea typeface="Cambria" panose="02040503050406030204" pitchFamily="18" charset="0"/>
+              </a:rPr>
+              <a:t>, som antal icke-</a:t>
+            </a:r>
+            <a:r>
+              <a:rPr lang="sv-SE" dirty="0" err="1">
+                <a:solidFill>
+                  <a:schemeClr val="bg1"/>
+                </a:solidFill>
+                <a:latin typeface="Cambria" panose="02040503050406030204" pitchFamily="18" charset="0"/>
+                <a:ea typeface="Cambria" panose="02040503050406030204" pitchFamily="18" charset="0"/>
+              </a:rPr>
+              <a:t>null</a:t>
+            </a:r>
+            <a:r>
+              <a:rPr lang="sv-SE" dirty="0">
+                <a:solidFill>
+                  <a:schemeClr val="bg1"/>
+                </a:solidFill>
+                <a:latin typeface="Cambria" panose="02040503050406030204" pitchFamily="18" charset="0"/>
+                <a:ea typeface="Cambria" panose="02040503050406030204" pitchFamily="18" charset="0"/>
+              </a:rPr>
+              <a:t> värden, datatyper och minnesanvändning</a:t>
+            </a:r>
+            <a:endParaRPr lang="sv-SE" sz="2000" dirty="0">
+              <a:solidFill>
+                <a:schemeClr val="bg1"/>
+              </a:solidFill>
+              <a:latin typeface="Cambria" panose="02040503050406030204" pitchFamily="18" charset="0"/>
+              <a:ea typeface="Cambria" panose="02040503050406030204" pitchFamily="18" charset="0"/>
+            </a:endParaRPr>
+          </a:p>
+          <a:p>
             <a:pPr marL="342900" indent="-342900">
               <a:buFont typeface="Wingdings" panose="05000000000000000000" pitchFamily="2" charset="2"/>
               <a:buChar char="Ø"/>
             </a:pPr>
             <a:r>
-              <a:rPr lang="sv-SE" sz="2000" dirty="0" err="1">
+              <a:rPr lang="sv-SE" sz="2000" b="1" dirty="0" err="1">
                 <a:solidFill>
                   <a:schemeClr val="bg1"/>
                 </a:solidFill>
@@ -14638,7 +14791,7 @@
               <a:t>nunique</a:t>
             </a:r>
             <a:r>
-              <a:rPr lang="sv-SE" sz="2000" dirty="0">
+              <a:rPr lang="sv-SE" sz="2000" b="1" dirty="0">
                 <a:solidFill>
                   <a:schemeClr val="bg1"/>
                 </a:solidFill>
@@ -14649,12 +14802,34 @@
             </a:r>
           </a:p>
           <a:p>
+            <a:r>
+              <a:rPr lang="sv-SE" sz="2000" dirty="0">
+                <a:solidFill>
+                  <a:schemeClr val="bg1"/>
+                </a:solidFill>
+                <a:latin typeface="Cambria" panose="02040503050406030204" pitchFamily="18" charset="0"/>
+                <a:ea typeface="Cambria" panose="02040503050406030204" pitchFamily="18" charset="0"/>
+              </a:rPr>
+              <a:t>	</a:t>
+            </a:r>
+            <a:r>
+              <a:rPr lang="sv-SE" dirty="0">
+                <a:solidFill>
+                  <a:schemeClr val="bg1"/>
+                </a:solidFill>
+                <a:latin typeface="Cambria" panose="02040503050406030204" pitchFamily="18" charset="0"/>
+                <a:ea typeface="Cambria" panose="02040503050406030204" pitchFamily="18" charset="0"/>
+              </a:rPr>
+              <a:t>Räknar antalet unika värden i en kolumn eller rad</a:t>
+            </a:r>
+          </a:p>
+          <a:p>
             <a:pPr marL="342900" indent="-342900">
               <a:buFont typeface="Wingdings" panose="05000000000000000000" pitchFamily="2" charset="2"/>
               <a:buChar char="Ø"/>
             </a:pPr>
             <a:r>
-              <a:rPr lang="sv-SE" sz="2000" dirty="0" err="1">
+              <a:rPr lang="sv-SE" sz="2000" b="1" dirty="0" err="1">
                 <a:solidFill>
                   <a:schemeClr val="bg1"/>
                 </a:solidFill>
@@ -14664,7 +14839,7 @@
               <a:t>unique</a:t>
             </a:r>
             <a:r>
-              <a:rPr lang="sv-SE" sz="2000" dirty="0">
+              <a:rPr lang="sv-SE" sz="2000" b="1" dirty="0">
                 <a:solidFill>
                   <a:schemeClr val="bg1"/>
                 </a:solidFill>
@@ -14675,12 +14850,54 @@
             </a:r>
           </a:p>
           <a:p>
+            <a:r>
+              <a:rPr lang="sv-SE" sz="2000" dirty="0">
+                <a:solidFill>
+                  <a:schemeClr val="bg1"/>
+                </a:solidFill>
+                <a:latin typeface="Cambria" panose="02040503050406030204" pitchFamily="18" charset="0"/>
+                <a:ea typeface="Cambria" panose="02040503050406030204" pitchFamily="18" charset="0"/>
+              </a:rPr>
+              <a:t>	</a:t>
+            </a:r>
+            <a:r>
+              <a:rPr lang="sv-SE" dirty="0">
+                <a:solidFill>
+                  <a:schemeClr val="bg1"/>
+                </a:solidFill>
+                <a:latin typeface="Cambria" panose="02040503050406030204" pitchFamily="18" charset="0"/>
+                <a:ea typeface="Cambria" panose="02040503050406030204" pitchFamily="18" charset="0"/>
+              </a:rPr>
+              <a:t>Returnerar en </a:t>
+            </a:r>
+            <a:r>
+              <a:rPr lang="sv-SE" dirty="0" err="1">
+                <a:solidFill>
+                  <a:schemeClr val="bg1"/>
+                </a:solidFill>
+                <a:latin typeface="Cambria" panose="02040503050406030204" pitchFamily="18" charset="0"/>
+                <a:ea typeface="Cambria" panose="02040503050406030204" pitchFamily="18" charset="0"/>
+              </a:rPr>
+              <a:t>array</a:t>
+            </a:r>
+            <a:r>
+              <a:rPr lang="sv-SE" dirty="0">
+                <a:solidFill>
+                  <a:schemeClr val="bg1"/>
+                </a:solidFill>
+                <a:latin typeface="Cambria" panose="02040503050406030204" pitchFamily="18" charset="0"/>
+                <a:ea typeface="Cambria" panose="02040503050406030204" pitchFamily="18" charset="0"/>
+              </a:rPr>
+              <a:t> med unika värden i en kolumn eller rad</a:t>
+            </a:r>
+          </a:p>
+          <a:p>
             <a:pPr marL="342900" indent="-342900">
               <a:buFont typeface="Wingdings" panose="05000000000000000000" pitchFamily="2" charset="2"/>
               <a:buChar char="Ø"/>
             </a:pPr>
             <a:r>
-              <a:rPr lang="sv-SE" sz="2000" dirty="0" err="1">
+              <a:rPr lang="sv-SE" sz="2000" b="1" dirty="0" err="1">
                 <a:solidFill>
                   <a:schemeClr val="bg1"/>
                 </a:solidFill>
@@ -14690,7 +14907,7 @@
               <a:t>value_count</a:t>
             </a:r>
             <a:r>
-              <a:rPr lang="sv-SE" sz="2000" dirty="0">
+              <a:rPr lang="sv-SE" sz="2000" b="1" dirty="0">
                 <a:solidFill>
                   <a:schemeClr val="bg1"/>
                 </a:solidFill>
@@ -14701,12 +14918,28 @@
             </a:r>
           </a:p>
           <a:p>
+            <a:r>
+              <a:rPr lang="sv-SE" sz="2000" dirty="0"/>
+              <a:t>	</a:t>
+            </a:r>
+            <a:r>
+              <a:rPr lang="sv-SE" dirty="0">
+                <a:solidFill>
+                  <a:schemeClr val="bg1"/>
+                </a:solidFill>
+                <a:latin typeface="Cambria" panose="02040503050406030204" pitchFamily="18" charset="0"/>
+                <a:ea typeface="Cambria" panose="02040503050406030204" pitchFamily="18" charset="0"/>
+              </a:rPr>
+              <a:t>Räknar förekomsten av varje unikt värde i en kolumn och returnerar en frekvenstabell</a:t>
+            </a:r>
+          </a:p>
+          <a:p>
             <a:pPr marL="342900" indent="-342900">
               <a:buFont typeface="Wingdings" panose="05000000000000000000" pitchFamily="2" charset="2"/>
               <a:buChar char="Ø"/>
             </a:pPr>
             <a:r>
-              <a:rPr lang="sv-SE" sz="2000" dirty="0" err="1">
+              <a:rPr lang="sv-SE" sz="2000" b="1" dirty="0" err="1">
                 <a:solidFill>
                   <a:schemeClr val="bg1"/>
                 </a:solidFill>
@@ -14716,7 +14949,7 @@
               <a:t>groupby</a:t>
             </a:r>
             <a:r>
-              <a:rPr lang="sv-SE" sz="2000" dirty="0">
+              <a:rPr lang="sv-SE" sz="2000" b="1" dirty="0">
                 <a:solidFill>
                   <a:schemeClr val="bg1"/>
                 </a:solidFill>
@@ -14727,22 +14960,44 @@
             </a:r>
           </a:p>
           <a:p>
+            <a:r>
+              <a:rPr lang="sv-SE" sz="2000" dirty="0">
+                <a:solidFill>
+                  <a:schemeClr val="bg1"/>
+                </a:solidFill>
+                <a:latin typeface="Cambria" panose="02040503050406030204" pitchFamily="18" charset="0"/>
+                <a:ea typeface="Cambria" panose="02040503050406030204" pitchFamily="18" charset="0"/>
+              </a:rPr>
+              <a:t>	</a:t>
+            </a:r>
+            <a:r>
+              <a:rPr lang="sv-SE" dirty="0">
+                <a:solidFill>
+                  <a:schemeClr val="bg1"/>
+                </a:solidFill>
+                <a:latin typeface="Cambria" panose="02040503050406030204" pitchFamily="18" charset="0"/>
+                <a:ea typeface="Cambria" panose="02040503050406030204" pitchFamily="18" charset="0"/>
+              </a:rPr>
+              <a:t>Grupperar data baserat på en eller flera kolumner</a:t>
+            </a:r>
+          </a:p>
+          <a:p>
             <a:pPr marL="342900" indent="-342900">
               <a:buFont typeface="Wingdings" panose="05000000000000000000" pitchFamily="2" charset="2"/>
               <a:buChar char="Ø"/>
             </a:pPr>
             <a:r>
-              <a:rPr lang="sv-SE" sz="2000" dirty="0" err="1">
+              <a:rPr lang="sv-SE" sz="2000" b="1" dirty="0" err="1">
                 <a:solidFill>
                   <a:schemeClr val="bg1"/>
                 </a:solidFill>
                 <a:latin typeface="Cambria" panose="02040503050406030204" pitchFamily="18" charset="0"/>
                 <a:ea typeface="Cambria" panose="02040503050406030204" pitchFamily="18" charset="0"/>
               </a:rPr>
-              <a:t>mean</a:t>
-            </a:r>
-            <a:r>
-              <a:rPr lang="sv-SE" sz="2000" dirty="0">
+              <a:t>Std</a:t>
+            </a:r>
+            <a:r>
+              <a:rPr lang="sv-SE" sz="2000" b="1" dirty="0">
                 <a:solidFill>
                   <a:schemeClr val="bg1"/>
                 </a:solidFill>
@@ -14753,78 +15008,33 @@
             </a:r>
           </a:p>
           <a:p>
-            <a:pPr marL="342900" indent="-342900">
-              <a:buFont typeface="Wingdings" panose="05000000000000000000" pitchFamily="2" charset="2"/>
-              <a:buChar char="Ø"/>
-            </a:pPr>
-            <a:r>
-              <a:rPr lang="sv-SE" sz="2000" dirty="0">
+            <a:r>
+              <a:rPr lang="sv-SE" sz="2000" b="1" dirty="0">
                 <a:solidFill>
                   <a:schemeClr val="bg1"/>
                 </a:solidFill>
                 <a:latin typeface="Cambria" panose="02040503050406030204" pitchFamily="18" charset="0"/>
                 <a:ea typeface="Cambria" panose="02040503050406030204" pitchFamily="18" charset="0"/>
               </a:rPr>
-              <a:t>median()</a:t>
-            </a:r>
-          </a:p>
-          <a:p>
-            <a:pPr marL="342900" indent="-342900">
-              <a:buFont typeface="Wingdings" panose="05000000000000000000" pitchFamily="2" charset="2"/>
-              <a:buChar char="Ø"/>
-            </a:pPr>
-            <a:r>
-              <a:rPr lang="sv-SE" sz="2000" dirty="0">
+              <a:t>	</a:t>
+            </a:r>
+            <a:r>
+              <a:rPr lang="sv-SE" dirty="0">
                 <a:solidFill>
                   <a:schemeClr val="bg1"/>
                 </a:solidFill>
                 <a:latin typeface="Cambria" panose="02040503050406030204" pitchFamily="18" charset="0"/>
                 <a:ea typeface="Cambria" panose="02040503050406030204" pitchFamily="18" charset="0"/>
               </a:rPr>
-              <a:t>min()</a:t>
-            </a:r>
-          </a:p>
-          <a:p>
-            <a:pPr marL="342900" indent="-342900">
-              <a:buFont typeface="Wingdings" panose="05000000000000000000" pitchFamily="2" charset="2"/>
-              <a:buChar char="Ø"/>
-            </a:pPr>
-            <a:r>
-              <a:rPr lang="sv-SE" sz="2000" dirty="0">
-                <a:solidFill>
-                  <a:schemeClr val="bg1"/>
-                </a:solidFill>
-                <a:latin typeface="Cambria" panose="02040503050406030204" pitchFamily="18" charset="0"/>
-                <a:ea typeface="Cambria" panose="02040503050406030204" pitchFamily="18" charset="0"/>
-              </a:rPr>
-              <a:t>max()</a:t>
-            </a:r>
-          </a:p>
-          <a:p>
-            <a:pPr marL="342900" indent="-342900">
-              <a:buFont typeface="Wingdings" panose="05000000000000000000" pitchFamily="2" charset="2"/>
-              <a:buChar char="Ø"/>
-            </a:pPr>
-            <a:r>
-              <a:rPr lang="sv-SE" sz="2000" dirty="0" err="1">
-                <a:solidFill>
-                  <a:schemeClr val="bg1"/>
-                </a:solidFill>
-                <a:latin typeface="Cambria" panose="02040503050406030204" pitchFamily="18" charset="0"/>
-                <a:ea typeface="Cambria" panose="02040503050406030204" pitchFamily="18" charset="0"/>
-              </a:rPr>
-              <a:t>std</a:t>
-            </a:r>
-            <a:r>
-              <a:rPr lang="sv-SE" sz="2000" dirty="0">
-                <a:solidFill>
-                  <a:schemeClr val="bg1"/>
-                </a:solidFill>
-                <a:latin typeface="Cambria" panose="02040503050406030204" pitchFamily="18" charset="0"/>
-                <a:ea typeface="Cambria" panose="02040503050406030204" pitchFamily="18" charset="0"/>
-              </a:rPr>
-              <a:t>()</a:t>
-            </a:r>
+              <a:t>Beräknar standard avvikelsen, vilket visar spridningen av data</a:t>
+            </a:r>
+            <a:endParaRPr lang="sv-SE" sz="2000" b="1" dirty="0">
+              <a:solidFill>
+                <a:schemeClr val="bg1"/>
+              </a:solidFill>
+              <a:latin typeface="Cambria" panose="02040503050406030204" pitchFamily="18" charset="0"/>
+              <a:ea typeface="Cambria" panose="02040503050406030204" pitchFamily="18" charset="0"/>
+            </a:endParaRPr>
           </a:p>
         </p:txBody>
       </p:sp>

</xml_diff>

<commit_message>
En ny slid om dashboard
</commit_message>
<xml_diff>
--- a/Presentation_OS.pptx
+++ b/Presentation_OS.pptx
@@ -13562,7 +13562,7 @@
         <p:spPr>
           <a:xfrm>
             <a:off x="1117600" y="766732"/>
-            <a:ext cx="9418320" cy="5632311"/>
+            <a:ext cx="9418320" cy="4924425"/>
           </a:xfrm>
           <a:prstGeom prst="rect">
             <a:avLst/>
@@ -13687,16 +13687,6 @@
               </a:rPr>
               <a:t> Berisha</a:t>
             </a:r>
-          </a:p>
-          <a:p>
-            <a:pPr algn="ctr"/>
-            <a:endParaRPr lang="sv-SE" sz="3600" dirty="0">
-              <a:solidFill>
-                <a:schemeClr val="bg1"/>
-              </a:solidFill>
-              <a:latin typeface="Cambria" panose="02040503050406030204" pitchFamily="18" charset="0"/>
-              <a:ea typeface="Cambria" panose="02040503050406030204" pitchFamily="18" charset="0"/>
-            </a:endParaRPr>
           </a:p>
         </p:txBody>
       </p:sp>
@@ -13780,8 +13770,8 @@
         </p:nvSpPr>
         <p:spPr>
           <a:xfrm>
-            <a:off x="868680" y="833120"/>
-            <a:ext cx="10596880" cy="5016758"/>
+            <a:off x="919480" y="801492"/>
+            <a:ext cx="10596880" cy="5047536"/>
           </a:xfrm>
           <a:prstGeom prst="rect">
             <a:avLst/>
@@ -13835,7 +13825,7 @@
               <a:buFont typeface="Arial" panose="020B0604020202020204" pitchFamily="34" charset="0"/>
               <a:buChar char="•"/>
             </a:pPr>
-            <a:endParaRPr lang="sv-SE" sz="2400" dirty="0">
+            <a:endParaRPr lang="sv-SE" sz="1600" dirty="0">
               <a:solidFill>
                 <a:schemeClr val="bg1"/>
               </a:solidFill>
@@ -13864,7 +13854,7 @@
               <a:buFont typeface="Arial" panose="020B0604020202020204" pitchFamily="34" charset="0"/>
               <a:buChar char="•"/>
             </a:pPr>
-            <a:endParaRPr lang="sv-SE" sz="2400" dirty="0">
+            <a:endParaRPr lang="sv-SE" sz="1600" dirty="0">
               <a:solidFill>
                 <a:schemeClr val="bg1"/>
               </a:solidFill>
@@ -13893,7 +13883,7 @@
               <a:buFont typeface="Arial" panose="020B0604020202020204" pitchFamily="34" charset="0"/>
               <a:buChar char="•"/>
             </a:pPr>
-            <a:endParaRPr lang="sv-SE" sz="2400" dirty="0">
+            <a:endParaRPr lang="sv-SE" sz="1600" dirty="0">
               <a:solidFill>
                 <a:schemeClr val="bg1"/>
               </a:solidFill>
@@ -13922,7 +13912,7 @@
               <a:buFont typeface="Arial" panose="020B0604020202020204" pitchFamily="34" charset="0"/>
               <a:buChar char="•"/>
             </a:pPr>
-            <a:endParaRPr lang="sv-SE" sz="2400" dirty="0">
+            <a:endParaRPr lang="sv-SE" sz="1600" dirty="0">
               <a:solidFill>
                 <a:schemeClr val="bg1"/>
               </a:solidFill>
@@ -13951,7 +13941,7 @@
               <a:buFont typeface="Arial" panose="020B0604020202020204" pitchFamily="34" charset="0"/>
               <a:buChar char="•"/>
             </a:pPr>
-            <a:endParaRPr lang="sv-SE" sz="2400" dirty="0">
+            <a:endParaRPr lang="sv-SE" sz="1600" dirty="0">
               <a:solidFill>
                 <a:schemeClr val="bg1"/>
               </a:solidFill>
@@ -13973,6 +13963,35 @@
                 <a:ea typeface="Cambria" panose="02040503050406030204" pitchFamily="18" charset="0"/>
               </a:rPr>
               <a:t>Vilka är de 10 länder som har tagit flest medaljer?</a:t>
+            </a:r>
+          </a:p>
+          <a:p>
+            <a:pPr marL="342900" indent="-342900">
+              <a:buFont typeface="Arial" panose="020B0604020202020204" pitchFamily="34" charset="0"/>
+              <a:buChar char="•"/>
+            </a:pPr>
+            <a:endParaRPr lang="sv-SE" sz="1600" dirty="0">
+              <a:solidFill>
+                <a:schemeClr val="bg1"/>
+              </a:solidFill>
+              <a:latin typeface="Cambria" panose="02040503050406030204" pitchFamily="18" charset="0"/>
+              <a:ea typeface="Cambria" panose="02040503050406030204" pitchFamily="18" charset="0"/>
+            </a:endParaRPr>
+          </a:p>
+          <a:p>
+            <a:pPr marL="342900" indent="-342900">
+              <a:buFont typeface="Arial" panose="020B0604020202020204" pitchFamily="34" charset="0"/>
+              <a:buChar char="•"/>
+            </a:pPr>
+            <a:r>
+              <a:rPr lang="sv-SE" sz="2400" dirty="0">
+                <a:solidFill>
+                  <a:schemeClr val="bg1"/>
+                </a:solidFill>
+                <a:latin typeface="Cambria" panose="02040503050406030204" pitchFamily="18" charset="0"/>
+                <a:ea typeface="Cambria" panose="02040503050406030204" pitchFamily="18" charset="0"/>
+              </a:rPr>
+              <a:t>Vilka diagram är mest lämpliga för att visualisera analysen? </a:t>
             </a:r>
           </a:p>
         </p:txBody>
@@ -14058,7 +14077,7 @@
         <p:spPr>
           <a:xfrm>
             <a:off x="934720" y="812800"/>
-            <a:ext cx="9042400" cy="4893647"/>
+            <a:ext cx="10657840" cy="5078313"/>
           </a:xfrm>
           <a:prstGeom prst="rect">
             <a:avLst/>
@@ -14151,16 +14170,42 @@
               </a:rPr>
               <a:t>Kaggle</a:t>
             </a:r>
-            <a:endParaRPr lang="sv-SE" sz="2000" dirty="0">
-              <a:solidFill>
-                <a:schemeClr val="bg1"/>
-              </a:solidFill>
-              <a:latin typeface="Cambria" panose="02040503050406030204" pitchFamily="18" charset="0"/>
-              <a:ea typeface="Cambria" panose="02040503050406030204" pitchFamily="18" charset="0"/>
-            </a:endParaRPr>
-          </a:p>
-          <a:p>
-            <a:endParaRPr lang="sv-SE" sz="2000" dirty="0">
+            <a:r>
+              <a:rPr lang="sv-SE" sz="2000" dirty="0">
+                <a:solidFill>
+                  <a:schemeClr val="bg1"/>
+                </a:solidFill>
+                <a:latin typeface="Cambria" panose="02040503050406030204" pitchFamily="18" charset="0"/>
+                <a:ea typeface="Cambria" panose="02040503050406030204" pitchFamily="18" charset="0"/>
+              </a:rPr>
+              <a:t>	</a:t>
+            </a:r>
+          </a:p>
+          <a:p>
+            <a:pPr lvl="1"/>
+            <a:r>
+              <a:rPr lang="sv-SE" sz="2000" dirty="0">
+                <a:solidFill>
+                  <a:schemeClr val="bg1"/>
+                </a:solidFill>
+                <a:latin typeface="Cambria" panose="02040503050406030204" pitchFamily="18" charset="0"/>
+                <a:ea typeface="Cambria" panose="02040503050406030204" pitchFamily="18" charset="0"/>
+              </a:rPr>
+              <a:t>	</a:t>
+            </a:r>
+            <a:r>
+              <a:rPr lang="sv-SE" dirty="0">
+                <a:solidFill>
+                  <a:schemeClr val="bg1"/>
+                </a:solidFill>
+                <a:latin typeface="Cambria" panose="02040503050406030204" pitchFamily="18" charset="0"/>
+                <a:ea typeface="Cambria" panose="02040503050406030204" pitchFamily="18" charset="0"/>
+              </a:rPr>
+              <a:t>En online-plattform med fokus på datavetenskap, maskininlärning och dataanalys</a:t>
+            </a:r>
+          </a:p>
+          <a:p>
+            <a:endParaRPr lang="sv-SE" sz="1200" dirty="0">
               <a:solidFill>
                 <a:schemeClr val="bg1"/>
               </a:solidFill>
@@ -16258,17 +16303,7 @@
                 <a:latin typeface="Cambria" panose="02040503050406030204" pitchFamily="18" charset="0"/>
                 <a:ea typeface="Cambria" panose="02040503050406030204" pitchFamily="18" charset="0"/>
               </a:rPr>
-              <a:t>Val av sport (fotboll, basket, judo) och relaterad statistik för </a:t>
-            </a:r>
-            <a:r>
-              <a:rPr lang="sv-SE" sz="2400">
-                <a:solidFill>
-                  <a:schemeClr val="bg1"/>
-                </a:solidFill>
-                <a:latin typeface="Cambria" panose="02040503050406030204" pitchFamily="18" charset="0"/>
-                <a:ea typeface="Cambria" panose="02040503050406030204" pitchFamily="18" charset="0"/>
-              </a:rPr>
-              <a:t>vald sport</a:t>
+              <a:t>Val av sport (fotboll, basket, judo) och relaterad statistik för vald sport</a:t>
             </a:r>
           </a:p>
           <a:p>
@@ -16277,24 +16312,14 @@
               <a:buChar char="•"/>
             </a:pPr>
             <a:r>
-              <a:rPr lang="sv-SE" sz="2400">
+              <a:rPr lang="sv-SE" sz="2400" dirty="0">
                 <a:solidFill>
                   <a:schemeClr val="bg1"/>
                 </a:solidFill>
                 <a:latin typeface="Cambria" panose="02040503050406030204" pitchFamily="18" charset="0"/>
                 <a:ea typeface="Cambria" panose="02040503050406030204" pitchFamily="18" charset="0"/>
               </a:rPr>
-              <a:t>Medaljfördelning </a:t>
-            </a:r>
-            <a:r>
-              <a:rPr lang="sv-SE" sz="2400" dirty="0">
-                <a:solidFill>
-                  <a:schemeClr val="bg1"/>
-                </a:solidFill>
-                <a:latin typeface="Cambria" panose="02040503050406030204" pitchFamily="18" charset="0"/>
-                <a:ea typeface="Cambria" panose="02040503050406030204" pitchFamily="18" charset="0"/>
-              </a:rPr>
-              <a:t>mellan länder för vald sport</a:t>
+              <a:t>Medaljfördelning mellan länder för vald sport</a:t>
             </a:r>
           </a:p>
           <a:p>
@@ -16442,8 +16467,25 @@
                 <a:latin typeface="Cambria" panose="02040503050406030204" pitchFamily="18" charset="0"/>
                 <a:ea typeface="Cambria" panose="02040503050406030204" pitchFamily="18" charset="0"/>
               </a:rPr>
-              <a:t>(fotboll, basket, judo </a:t>
-            </a:r>
+              <a:t>(fotboll, basket</a:t>
+            </a:r>
+            <a:r>
+              <a:rPr lang="sv-SE" sz="2400">
+                <a:solidFill>
+                  <a:schemeClr val="bg1"/>
+                </a:solidFill>
+                <a:latin typeface="Cambria" panose="02040503050406030204" pitchFamily="18" charset="0"/>
+                <a:ea typeface="Cambria" panose="02040503050406030204" pitchFamily="18" charset="0"/>
+              </a:rPr>
+              <a:t>, judo) </a:t>
+            </a:r>
+            <a:endParaRPr lang="sv-SE" sz="2400" dirty="0">
+              <a:solidFill>
+                <a:schemeClr val="bg1"/>
+              </a:solidFill>
+              <a:latin typeface="Cambria" panose="02040503050406030204" pitchFamily="18" charset="0"/>
+              <a:ea typeface="Cambria" panose="02040503050406030204" pitchFamily="18" charset="0"/>
+            </a:endParaRPr>
           </a:p>
           <a:p>
             <a:pPr marL="800100" lvl="1" indent="-342900">

</xml_diff>

<commit_message>
Ny slid om Dashboard
</commit_message>
<xml_diff>
--- a/Presentation_OS.pptx
+++ b/Presentation_OS.pptx
@@ -16242,7 +16242,7 @@
         <p:spPr>
           <a:xfrm>
             <a:off x="774198" y="916774"/>
-            <a:ext cx="10418580" cy="5024452"/>
+            <a:ext cx="10418580" cy="4747453"/>
           </a:xfrm>
           <a:prstGeom prst="rect">
             <a:avLst/>
@@ -16467,25 +16467,8 @@
                 <a:latin typeface="Cambria" panose="02040503050406030204" pitchFamily="18" charset="0"/>
                 <a:ea typeface="Cambria" panose="02040503050406030204" pitchFamily="18" charset="0"/>
               </a:rPr>
-              <a:t>(fotboll, basket</a:t>
-            </a:r>
-            <a:r>
-              <a:rPr lang="sv-SE" sz="2400">
-                <a:solidFill>
-                  <a:schemeClr val="bg1"/>
-                </a:solidFill>
-                <a:latin typeface="Cambria" panose="02040503050406030204" pitchFamily="18" charset="0"/>
-                <a:ea typeface="Cambria" panose="02040503050406030204" pitchFamily="18" charset="0"/>
-              </a:rPr>
-              <a:t>, judo) </a:t>
-            </a:r>
-            <a:endParaRPr lang="sv-SE" sz="2400" dirty="0">
-              <a:solidFill>
-                <a:schemeClr val="bg1"/>
-              </a:solidFill>
-              <a:latin typeface="Cambria" panose="02040503050406030204" pitchFamily="18" charset="0"/>
-              <a:ea typeface="Cambria" panose="02040503050406030204" pitchFamily="18" charset="0"/>
-            </a:endParaRPr>
+              <a:t>(fotboll, basket, judo) </a:t>
+            </a:r>
           </a:p>
           <a:p>
             <a:pPr marL="800100" lvl="1" indent="-342900">
@@ -16500,7 +16483,17 @@
                 <a:latin typeface="Cambria" panose="02040503050406030204" pitchFamily="18" charset="0"/>
                 <a:ea typeface="Cambria" panose="02040503050406030204" pitchFamily="18" charset="0"/>
               </a:rPr>
-              <a:t>Val av sport (fotboll, basket, judo) från olika kontinenter </a:t>
+              <a:t>Val av sport (fotboll, basket, judo) från olika </a:t>
+            </a:r>
+            <a:r>
+              <a:rPr lang="sv-SE" sz="2400">
+                <a:solidFill>
+                  <a:schemeClr val="bg1"/>
+                </a:solidFill>
+                <a:latin typeface="Cambria" panose="02040503050406030204" pitchFamily="18" charset="0"/>
+                <a:ea typeface="Cambria" panose="02040503050406030204" pitchFamily="18" charset="0"/>
+              </a:rPr>
+              <a:t>kontinenter </a:t>
             </a:r>
             <a:endParaRPr lang="sv-SE" sz="2400" i="0" u="none" strike="noStrike" baseline="0" dirty="0">
               <a:solidFill>
@@ -16509,9 +16502,6 @@
               <a:latin typeface="Cambria" panose="02040503050406030204" pitchFamily="18" charset="0"/>
               <a:ea typeface="Cambria" panose="02040503050406030204" pitchFamily="18" charset="0"/>
             </a:endParaRPr>
-          </a:p>
-          <a:p>
-            <a:endParaRPr lang="sv-SE" dirty="0"/>
           </a:p>
         </p:txBody>
       </p:sp>

</xml_diff>

<commit_message>
Ändrat på innehållet i slid 2
</commit_message>
<xml_diff>
--- a/Presentation_OS.pptx
+++ b/Presentation_OS.pptx
@@ -14098,7 +14098,7 @@
                 <a:latin typeface="Cambria" panose="02040503050406030204" pitchFamily="18" charset="0"/>
                 <a:ea typeface="Cambria" panose="02040503050406030204" pitchFamily="18" charset="0"/>
               </a:rPr>
-              <a:t>Tekniker och verktyg som har använts:</a:t>
+              <a:t>Tekniker och verktyg</a:t>
             </a:r>
           </a:p>
           <a:p>
@@ -14588,7 +14588,7 @@
                 <a:latin typeface="Cambria" panose="02040503050406030204" pitchFamily="18" charset="0"/>
                 <a:ea typeface="Cambria" panose="02040503050406030204" pitchFamily="18" charset="0"/>
               </a:rPr>
-              <a:t>Analysmetoder:</a:t>
+              <a:t>Analysmetoder</a:t>
             </a:r>
           </a:p>
           <a:p>
@@ -15186,7 +15186,7 @@
                 <a:latin typeface="Cambria" panose="02040503050406030204" pitchFamily="18" charset="0"/>
                 <a:ea typeface="Cambria" panose="02040503050406030204" pitchFamily="18" charset="0"/>
               </a:rPr>
-              <a:t>Användning av olika diagram och graf:</a:t>
+              <a:t>Visualiseringsverktyg</a:t>
             </a:r>
           </a:p>
           <a:p>
@@ -15385,7 +15385,7 @@
                 <a:latin typeface="Cambria" panose="02040503050406030204" pitchFamily="18" charset="0"/>
                 <a:ea typeface="Cambria" panose="02040503050406030204" pitchFamily="18" charset="0"/>
               </a:rPr>
-              <a:t>Interaktiv visualisering</a:t>
+              <a:t>Interaktivitet </a:t>
             </a:r>
           </a:p>
           <a:p>
@@ -15568,16 +15568,13 @@
               </a:rPr>
               <a:t>dashboardapplikationen</a:t>
             </a:r>
-            <a:r>
-              <a:rPr lang="sv-SE" sz="3200" b="1" i="0" u="none" strike="noStrike" baseline="0" dirty="0">
-                <a:solidFill>
-                  <a:schemeClr val="bg1"/>
-                </a:solidFill>
-                <a:latin typeface="Cambria" panose="02040503050406030204" pitchFamily="18" charset="0"/>
-                <a:ea typeface="Cambria" panose="02040503050406030204" pitchFamily="18" charset="0"/>
-              </a:rPr>
-              <a:t>:</a:t>
-            </a:r>
+            <a:endParaRPr lang="sv-SE" sz="3200" b="1" i="0" u="none" strike="noStrike" baseline="0" dirty="0">
+              <a:solidFill>
+                <a:schemeClr val="bg1"/>
+              </a:solidFill>
+              <a:latin typeface="Cambria" panose="02040503050406030204" pitchFamily="18" charset="0"/>
+              <a:ea typeface="Cambria" panose="02040503050406030204" pitchFamily="18" charset="0"/>
+            </a:endParaRPr>
           </a:p>
           <a:p>
             <a:endParaRPr lang="sv-SE" sz="3200" dirty="0">

</xml_diff>